<commit_message>
working on a project
</commit_message>
<xml_diff>
--- a/Проект_светофор/презента.pptx
+++ b/Проект_светофор/презента.pptx
@@ -8,7 +8,7 @@
     <p:sldId id="256" r:id="rId2"/>
     <p:sldId id="262" r:id="rId3"/>
     <p:sldId id="257" r:id="rId4"/>
-    <p:sldId id="258" r:id="rId5"/>
+    <p:sldId id="263" r:id="rId5"/>
     <p:sldId id="259" r:id="rId6"/>
     <p:sldId id="261" r:id="rId7"/>
     <p:sldId id="260" r:id="rId8"/>
@@ -118,7 +118,7 @@
             <p14:sldId id="256"/>
             <p14:sldId id="262"/>
             <p14:sldId id="257"/>
-            <p14:sldId id="258"/>
+            <p14:sldId id="263"/>
             <p14:sldId id="259"/>
             <p14:sldId id="261"/>
             <p14:sldId id="260"/>
@@ -264,7 +264,7 @@
           <a:p>
             <a:fld id="{165D581F-4EEB-4706-9DED-BD4D1E2770EF}" type="datetimeFigureOut">
               <a:rPr lang="ru-RU" smtClean="0"/>
-              <a:t>17.02.2017</a:t>
+              <a:t>06.03.2017</a:t>
             </a:fld>
             <a:endParaRPr lang="ru-RU"/>
           </a:p>
@@ -434,7 +434,7 @@
           <a:p>
             <a:fld id="{165D581F-4EEB-4706-9DED-BD4D1E2770EF}" type="datetimeFigureOut">
               <a:rPr lang="ru-RU" smtClean="0"/>
-              <a:t>17.02.2017</a:t>
+              <a:t>06.03.2017</a:t>
             </a:fld>
             <a:endParaRPr lang="ru-RU"/>
           </a:p>
@@ -614,7 +614,7 @@
           <a:p>
             <a:fld id="{165D581F-4EEB-4706-9DED-BD4D1E2770EF}" type="datetimeFigureOut">
               <a:rPr lang="ru-RU" smtClean="0"/>
-              <a:t>17.02.2017</a:t>
+              <a:t>06.03.2017</a:t>
             </a:fld>
             <a:endParaRPr lang="ru-RU"/>
           </a:p>
@@ -784,7 +784,7 @@
           <a:p>
             <a:fld id="{165D581F-4EEB-4706-9DED-BD4D1E2770EF}" type="datetimeFigureOut">
               <a:rPr lang="ru-RU" smtClean="0"/>
-              <a:t>17.02.2017</a:t>
+              <a:t>06.03.2017</a:t>
             </a:fld>
             <a:endParaRPr lang="ru-RU"/>
           </a:p>
@@ -1030,7 +1030,7 @@
           <a:p>
             <a:fld id="{165D581F-4EEB-4706-9DED-BD4D1E2770EF}" type="datetimeFigureOut">
               <a:rPr lang="ru-RU" smtClean="0"/>
-              <a:t>17.02.2017</a:t>
+              <a:t>06.03.2017</a:t>
             </a:fld>
             <a:endParaRPr lang="ru-RU"/>
           </a:p>
@@ -1262,7 +1262,7 @@
           <a:p>
             <a:fld id="{165D581F-4EEB-4706-9DED-BD4D1E2770EF}" type="datetimeFigureOut">
               <a:rPr lang="ru-RU" smtClean="0"/>
-              <a:t>17.02.2017</a:t>
+              <a:t>06.03.2017</a:t>
             </a:fld>
             <a:endParaRPr lang="ru-RU"/>
           </a:p>
@@ -1629,7 +1629,7 @@
           <a:p>
             <a:fld id="{165D581F-4EEB-4706-9DED-BD4D1E2770EF}" type="datetimeFigureOut">
               <a:rPr lang="ru-RU" smtClean="0"/>
-              <a:t>17.02.2017</a:t>
+              <a:t>06.03.2017</a:t>
             </a:fld>
             <a:endParaRPr lang="ru-RU"/>
           </a:p>
@@ -1747,7 +1747,7 @@
           <a:p>
             <a:fld id="{165D581F-4EEB-4706-9DED-BD4D1E2770EF}" type="datetimeFigureOut">
               <a:rPr lang="ru-RU" smtClean="0"/>
-              <a:t>17.02.2017</a:t>
+              <a:t>06.03.2017</a:t>
             </a:fld>
             <a:endParaRPr lang="ru-RU"/>
           </a:p>
@@ -1842,7 +1842,7 @@
           <a:p>
             <a:fld id="{165D581F-4EEB-4706-9DED-BD4D1E2770EF}" type="datetimeFigureOut">
               <a:rPr lang="ru-RU" smtClean="0"/>
-              <a:t>17.02.2017</a:t>
+              <a:t>06.03.2017</a:t>
             </a:fld>
             <a:endParaRPr lang="ru-RU"/>
           </a:p>
@@ -2119,7 +2119,7 @@
           <a:p>
             <a:fld id="{165D581F-4EEB-4706-9DED-BD4D1E2770EF}" type="datetimeFigureOut">
               <a:rPr lang="ru-RU" smtClean="0"/>
-              <a:t>17.02.2017</a:t>
+              <a:t>06.03.2017</a:t>
             </a:fld>
             <a:endParaRPr lang="ru-RU"/>
           </a:p>
@@ -2372,7 +2372,7 @@
           <a:p>
             <a:fld id="{165D581F-4EEB-4706-9DED-BD4D1E2770EF}" type="datetimeFigureOut">
               <a:rPr lang="ru-RU" smtClean="0"/>
-              <a:t>17.02.2017</a:t>
+              <a:t>06.03.2017</a:t>
             </a:fld>
             <a:endParaRPr lang="ru-RU"/>
           </a:p>
@@ -2585,7 +2585,7 @@
           <a:p>
             <a:fld id="{165D581F-4EEB-4706-9DED-BD4D1E2770EF}" type="datetimeFigureOut">
               <a:rPr lang="ru-RU" smtClean="0"/>
-              <a:t>17.02.2017</a:t>
+              <a:t>06.03.2017</a:t>
             </a:fld>
             <a:endParaRPr lang="ru-RU"/>
           </a:p>
@@ -3109,7 +3109,43 @@
           <a:bodyPr/>
           <a:lstStyle/>
           <a:p>
-            <a:endParaRPr lang="ru-RU"/>
+            <a:r>
+              <a:rPr lang="en-US" dirty="0" smtClean="0"/>
+              <a:t>Sergei </a:t>
+            </a:r>
+            <a:r>
+              <a:rPr lang="en-US" dirty="0" err="1" smtClean="0"/>
+              <a:t>Filippov</a:t>
+            </a:r>
+            <a:r>
+              <a:rPr lang="en-US" dirty="0" smtClean="0"/>
+              <a:t>, 9 grade</a:t>
+            </a:r>
+          </a:p>
+          <a:p>
+            <a:r>
+              <a:rPr lang="en-US" dirty="0" err="1" smtClean="0"/>
+              <a:t>Yakov</a:t>
+            </a:r>
+            <a:r>
+              <a:rPr lang="en-US" dirty="0" smtClean="0"/>
+              <a:t> </a:t>
+            </a:r>
+            <a:r>
+              <a:rPr lang="en-US" dirty="0" err="1" smtClean="0"/>
+              <a:t>Degaltsev</a:t>
+            </a:r>
+            <a:r>
+              <a:rPr lang="en-US" dirty="0" smtClean="0"/>
+              <a:t>, 11 grade</a:t>
+            </a:r>
+          </a:p>
+          <a:p>
+            <a:r>
+              <a:rPr lang="en-US" dirty="0" smtClean="0"/>
+              <a:t>TEAM FOTO</a:t>
+            </a:r>
+            <a:endParaRPr lang="ru-RU" dirty="0"/>
           </a:p>
         </p:txBody>
       </p:sp>
@@ -3160,7 +3196,11 @@
           <a:p>
             <a:r>
               <a:rPr lang="ru-RU" dirty="0" smtClean="0"/>
-              <a:t>Существующая проблема</a:t>
+              <a:t>Существующая </a:t>
+            </a:r>
+            <a:r>
+              <a:rPr lang="ru-RU" dirty="0" smtClean="0"/>
+              <a:t>проблема и ее последствия </a:t>
             </a:r>
             <a:endParaRPr lang="ru-RU" dirty="0"/>
           </a:p>
@@ -3183,15 +3223,53 @@
           <a:p>
             <a:r>
               <a:rPr lang="ru-RU" dirty="0" smtClean="0"/>
-              <a:t>Очень часто неправильное распределение положений светофора является причиной пробок и ненужного ожидания.</a:t>
-            </a:r>
-          </a:p>
-          <a:p>
+              <a:t>Очень часто неправильное распределение положений светофора является </a:t>
+            </a:r>
             <a:r>
               <a:rPr lang="ru-RU" dirty="0" smtClean="0"/>
-              <a:t>факты</a:t>
-            </a:r>
-            <a:endParaRPr lang="ru-RU" dirty="0"/>
+              <a:t>причиной</a:t>
+            </a:r>
+            <a:r>
+              <a:rPr lang="ru-RU" dirty="0"/>
+              <a:t> </a:t>
+            </a:r>
+            <a:r>
+              <a:rPr lang="ru-RU" dirty="0" smtClean="0"/>
+              <a:t>неоправданных</a:t>
+            </a:r>
+            <a:r>
+              <a:rPr lang="ru-RU" dirty="0" smtClean="0"/>
+              <a:t> </a:t>
+            </a:r>
+            <a:r>
+              <a:rPr lang="ru-RU" dirty="0" smtClean="0"/>
+              <a:t>пробок и ненужного ожидания</a:t>
+            </a:r>
+            <a:r>
+              <a:rPr lang="ru-RU" dirty="0" smtClean="0"/>
+              <a:t>.</a:t>
+            </a:r>
+          </a:p>
+          <a:p>
+            <a:r>
+              <a:rPr lang="ru-RU" dirty="0"/>
+              <a:t>Последствия отражаются как на дорожном движении, так и на пешеходном.</a:t>
+            </a:r>
+          </a:p>
+          <a:p>
+            <a:r>
+              <a:rPr lang="ru-RU" dirty="0"/>
+              <a:t>Пешеходы вынуждены долго ждать, и/или дается мало времени на переход.</a:t>
+            </a:r>
+          </a:p>
+          <a:p>
+            <a:r>
+              <a:rPr lang="ru-RU" dirty="0"/>
+              <a:t>Если же недостаточное количество времени дается дорожному транспорту, то неминуемо появления пробок или других ситуаций затрудняющих движение.</a:t>
+            </a:r>
+          </a:p>
+          <a:p>
+            <a:endParaRPr lang="ru-RU" dirty="0" smtClean="0"/>
           </a:p>
         </p:txBody>
       </p:sp>
@@ -3242,7 +3320,7 @@
           <a:p>
             <a:r>
               <a:rPr lang="ru-RU" dirty="0" smtClean="0"/>
-              <a:t>Последствия проблемы</a:t>
+              <a:t>	Примеры</a:t>
             </a:r>
             <a:endParaRPr lang="ru-RU" dirty="0"/>
           </a:p>
@@ -3263,14 +3341,20 @@
           <a:bodyPr/>
           <a:lstStyle/>
           <a:p>
-            <a:endParaRPr lang="ru-RU"/>
+            <a:r>
+              <a:rPr lang="ru-RU" dirty="0"/>
+              <a:t>Например светофор на улице нашей школы – переход очень маленький, но красный горит минуты 2, тогда как зеленый 20 секунд, и маломобильным группам граждан невозможно за этот срок перейти дорогу.</a:t>
+            </a:r>
+          </a:p>
+          <a:p>
+            <a:endParaRPr lang="ru-RU" dirty="0"/>
           </a:p>
         </p:txBody>
       </p:sp>
     </p:spTree>
     <p:extLst>
       <p:ext uri="{BB962C8B-B14F-4D97-AF65-F5344CB8AC3E}">
-        <p14:creationId xmlns:p14="http://schemas.microsoft.com/office/powerpoint/2010/main" val="3277459721"/>
+        <p14:creationId xmlns:p14="http://schemas.microsoft.com/office/powerpoint/2010/main" val="2429258028"/>
       </p:ext>
     </p:extLst>
   </p:cSld>
@@ -3335,7 +3419,32 @@
           <a:bodyPr/>
           <a:lstStyle/>
           <a:p>
-            <a:endParaRPr lang="ru-RU"/>
+            <a:r>
+              <a:rPr lang="ru-RU" dirty="0" smtClean="0"/>
+              <a:t>Если светофоры смогут определять количество машин в данный момент находящихся на перекрестке, то все эти проблемы могут быть решены</a:t>
+            </a:r>
+          </a:p>
+          <a:p>
+            <a:r>
+              <a:rPr lang="ru-RU" dirty="0" smtClean="0"/>
+              <a:t>Определить машину и их количество можно по уникальному коды машины – номеру, попутно можно отслеживать место нахождение и передвижение конкретного транспортного средства. Чем больше машин, тем больше времени им будет предоставлено, </a:t>
+            </a:r>
+            <a:r>
+              <a:rPr lang="ru-RU" smtClean="0"/>
+              <a:t>до определенной границы </a:t>
+            </a:r>
+            <a:r>
+              <a:rPr lang="ru-RU" dirty="0" smtClean="0"/>
+              <a:t>конечно.</a:t>
+            </a:r>
+            <a:endParaRPr lang="ru-RU" dirty="0" smtClean="0"/>
+          </a:p>
+          <a:p>
+            <a:r>
+              <a:rPr lang="ru-RU" b="1" dirty="0" smtClean="0"/>
+              <a:t>Как определять людей на перекресте и в частности маломобильны</a:t>
+            </a:r>
+            <a:endParaRPr lang="ru-RU" b="1" dirty="0"/>
           </a:p>
         </p:txBody>
       </p:sp>

</xml_diff>

<commit_message>
+the symbol of school everywhere
</commit_message>
<xml_diff>
--- a/Проект_светофор/презента.pptx
+++ b/Проект_светофор/презента.pptx
@@ -3041,6 +3041,47 @@
           </a:p>
         </p:txBody>
       </p:sp>
+      <p:pic>
+        <p:nvPicPr>
+          <p:cNvPr id="1028" name="Picture 4" descr="http://www.litceysel.ru/amda/%D0%9F%D1%80%D0%BE%D0%B3%D1%80%D0%B0%D0%BC%D0%BC%D0%B0+%D0%BA%D0%BE%D0%BD%D1%84%D0%B5%D1%80%D0%B5%D0%BD%D1%86%D0%B8%D0%B8+I.+15.+00-+15.+05a/166374_html_m8967760.jpg"/>
+          <p:cNvPicPr>
+            <a:picLocks noChangeAspect="1" noChangeArrowheads="1"/>
+          </p:cNvPicPr>
+          <p:nvPr/>
+        </p:nvPicPr>
+        <p:blipFill>
+          <a:blip r:embed="rId2" cstate="print">
+            <a:extLst>
+              <a:ext uri="{28A0092B-C50C-407E-A947-70E740481C1C}">
+                <a14:useLocalDpi xmlns:a14="http://schemas.microsoft.com/office/drawing/2010/main" val="0"/>
+              </a:ext>
+            </a:extLst>
+          </a:blip>
+          <a:srcRect/>
+          <a:stretch>
+            <a:fillRect/>
+          </a:stretch>
+        </p:blipFill>
+        <p:spPr bwMode="auto">
+          <a:xfrm>
+            <a:off x="10440577" y="149901"/>
+            <a:ext cx="1617251" cy="855856"/>
+          </a:xfrm>
+          <a:prstGeom prst="rect">
+            <a:avLst/>
+          </a:prstGeom>
+          <a:noFill/>
+          <a:extLst>
+            <a:ext uri="{909E8E84-426E-40DD-AFC4-6F175D3DCCD1}">
+              <a14:hiddenFill xmlns:a14="http://schemas.microsoft.com/office/drawing/2010/main">
+                <a:solidFill>
+                  <a:srgbClr val="FFFFFF"/>
+                </a:solidFill>
+              </a14:hiddenFill>
+            </a:ext>
+          </a:extLst>
+        </p:spPr>
+      </p:pic>
     </p:spTree>
     <p:extLst>
       <p:ext uri="{BB962C8B-B14F-4D97-AF65-F5344CB8AC3E}">
@@ -3149,6 +3190,47 @@
           </a:p>
         </p:txBody>
       </p:sp>
+      <p:pic>
+        <p:nvPicPr>
+          <p:cNvPr id="4" name="Picture 4" descr="http://www.litceysel.ru/amda/%D0%9F%D1%80%D0%BE%D0%B3%D1%80%D0%B0%D0%BC%D0%BC%D0%B0+%D0%BA%D0%BE%D0%BD%D1%84%D0%B5%D1%80%D0%B5%D0%BD%D1%86%D0%B8%D0%B8+I.+15.+00-+15.+05a/166374_html_m8967760.jpg"/>
+          <p:cNvPicPr>
+            <a:picLocks noChangeAspect="1" noChangeArrowheads="1"/>
+          </p:cNvPicPr>
+          <p:nvPr/>
+        </p:nvPicPr>
+        <p:blipFill>
+          <a:blip r:embed="rId2" cstate="print">
+            <a:extLst>
+              <a:ext uri="{28A0092B-C50C-407E-A947-70E740481C1C}">
+                <a14:useLocalDpi xmlns:a14="http://schemas.microsoft.com/office/drawing/2010/main" val="0"/>
+              </a:ext>
+            </a:extLst>
+          </a:blip>
+          <a:srcRect/>
+          <a:stretch>
+            <a:fillRect/>
+          </a:stretch>
+        </p:blipFill>
+        <p:spPr bwMode="auto">
+          <a:xfrm>
+            <a:off x="10440577" y="149901"/>
+            <a:ext cx="1617251" cy="855856"/>
+          </a:xfrm>
+          <a:prstGeom prst="rect">
+            <a:avLst/>
+          </a:prstGeom>
+          <a:noFill/>
+          <a:extLst>
+            <a:ext uri="{909E8E84-426E-40DD-AFC4-6F175D3DCCD1}">
+              <a14:hiddenFill xmlns:a14="http://schemas.microsoft.com/office/drawing/2010/main">
+                <a:solidFill>
+                  <a:srgbClr val="FFFFFF"/>
+                </a:solidFill>
+              </a14:hiddenFill>
+            </a:ext>
+          </a:extLst>
+        </p:spPr>
+      </p:pic>
     </p:spTree>
     <p:extLst>
       <p:ext uri="{BB962C8B-B14F-4D97-AF65-F5344CB8AC3E}">
@@ -3196,38 +3278,30 @@
           <a:p>
             <a:r>
               <a:rPr lang="ru-RU" dirty="0" smtClean="0"/>
-              <a:t>Существующая </a:t>
-            </a:r>
+              <a:t>Существующая проблема и ее последствия </a:t>
+            </a:r>
+            <a:endParaRPr lang="ru-RU" dirty="0"/>
+          </a:p>
+        </p:txBody>
+      </p:sp>
+      <p:sp>
+        <p:nvSpPr>
+          <p:cNvPr id="3" name="Объект 2"/>
+          <p:cNvSpPr>
+            <a:spLocks noGrp="1"/>
+          </p:cNvSpPr>
+          <p:nvPr>
+            <p:ph idx="1"/>
+          </p:nvPr>
+        </p:nvSpPr>
+        <p:spPr/>
+        <p:txBody>
+          <a:bodyPr/>
+          <a:lstStyle/>
+          <a:p>
             <a:r>
               <a:rPr lang="ru-RU" dirty="0" smtClean="0"/>
-              <a:t>проблема и ее последствия </a:t>
-            </a:r>
-            <a:endParaRPr lang="ru-RU" dirty="0"/>
-          </a:p>
-        </p:txBody>
-      </p:sp>
-      <p:sp>
-        <p:nvSpPr>
-          <p:cNvPr id="3" name="Объект 2"/>
-          <p:cNvSpPr>
-            <a:spLocks noGrp="1"/>
-          </p:cNvSpPr>
-          <p:nvPr>
-            <p:ph idx="1"/>
-          </p:nvPr>
-        </p:nvSpPr>
-        <p:spPr/>
-        <p:txBody>
-          <a:bodyPr/>
-          <a:lstStyle/>
-          <a:p>
-            <a:r>
-              <a:rPr lang="ru-RU" dirty="0" smtClean="0"/>
-              <a:t>Очень часто неправильное распределение положений светофора является </a:t>
-            </a:r>
-            <a:r>
-              <a:rPr lang="ru-RU" dirty="0" smtClean="0"/>
-              <a:t>причиной</a:t>
+              <a:t>Очень часто неправильное распределение положений светофора является причиной</a:t>
             </a:r>
             <a:r>
               <a:rPr lang="ru-RU" dirty="0"/>
@@ -3235,19 +3309,7 @@
             </a:r>
             <a:r>
               <a:rPr lang="ru-RU" dirty="0" smtClean="0"/>
-              <a:t>неоправданных</a:t>
-            </a:r>
-            <a:r>
-              <a:rPr lang="ru-RU" dirty="0" smtClean="0"/>
-              <a:t> </a:t>
-            </a:r>
-            <a:r>
-              <a:rPr lang="ru-RU" dirty="0" smtClean="0"/>
-              <a:t>пробок и ненужного ожидания</a:t>
-            </a:r>
-            <a:r>
-              <a:rPr lang="ru-RU" dirty="0" smtClean="0"/>
-              <a:t>.</a:t>
+              <a:t>неоправданных пробок и ненужного ожидания.</a:t>
             </a:r>
           </a:p>
           <a:p>
@@ -3273,6 +3335,47 @@
           </a:p>
         </p:txBody>
       </p:sp>
+      <p:pic>
+        <p:nvPicPr>
+          <p:cNvPr id="4" name="Picture 4" descr="http://www.litceysel.ru/amda/%D0%9F%D1%80%D0%BE%D0%B3%D1%80%D0%B0%D0%BC%D0%BC%D0%B0+%D0%BA%D0%BE%D0%BD%D1%84%D0%B5%D1%80%D0%B5%D0%BD%D1%86%D0%B8%D0%B8+I.+15.+00-+15.+05a/166374_html_m8967760.jpg"/>
+          <p:cNvPicPr>
+            <a:picLocks noChangeAspect="1" noChangeArrowheads="1"/>
+          </p:cNvPicPr>
+          <p:nvPr/>
+        </p:nvPicPr>
+        <p:blipFill>
+          <a:blip r:embed="rId2" cstate="print">
+            <a:extLst>
+              <a:ext uri="{28A0092B-C50C-407E-A947-70E740481C1C}">
+                <a14:useLocalDpi xmlns:a14="http://schemas.microsoft.com/office/drawing/2010/main" val="0"/>
+              </a:ext>
+            </a:extLst>
+          </a:blip>
+          <a:srcRect/>
+          <a:stretch>
+            <a:fillRect/>
+          </a:stretch>
+        </p:blipFill>
+        <p:spPr bwMode="auto">
+          <a:xfrm>
+            <a:off x="10440577" y="149901"/>
+            <a:ext cx="1617251" cy="855856"/>
+          </a:xfrm>
+          <a:prstGeom prst="rect">
+            <a:avLst/>
+          </a:prstGeom>
+          <a:noFill/>
+          <a:extLst>
+            <a:ext uri="{909E8E84-426E-40DD-AFC4-6F175D3DCCD1}">
+              <a14:hiddenFill xmlns:a14="http://schemas.microsoft.com/office/drawing/2010/main">
+                <a:solidFill>
+                  <a:srgbClr val="FFFFFF"/>
+                </a:solidFill>
+              </a14:hiddenFill>
+            </a:ext>
+          </a:extLst>
+        </p:spPr>
+      </p:pic>
     </p:spTree>
     <p:extLst>
       <p:ext uri="{BB962C8B-B14F-4D97-AF65-F5344CB8AC3E}">
@@ -3351,6 +3454,47 @@
           </a:p>
         </p:txBody>
       </p:sp>
+      <p:pic>
+        <p:nvPicPr>
+          <p:cNvPr id="4" name="Picture 4" descr="http://www.litceysel.ru/amda/%D0%9F%D1%80%D0%BE%D0%B3%D1%80%D0%B0%D0%BC%D0%BC%D0%B0+%D0%BA%D0%BE%D0%BD%D1%84%D0%B5%D1%80%D0%B5%D0%BD%D1%86%D0%B8%D0%B8+I.+15.+00-+15.+05a/166374_html_m8967760.jpg"/>
+          <p:cNvPicPr>
+            <a:picLocks noChangeAspect="1" noChangeArrowheads="1"/>
+          </p:cNvPicPr>
+          <p:nvPr/>
+        </p:nvPicPr>
+        <p:blipFill>
+          <a:blip r:embed="rId2" cstate="print">
+            <a:extLst>
+              <a:ext uri="{28A0092B-C50C-407E-A947-70E740481C1C}">
+                <a14:useLocalDpi xmlns:a14="http://schemas.microsoft.com/office/drawing/2010/main" val="0"/>
+              </a:ext>
+            </a:extLst>
+          </a:blip>
+          <a:srcRect/>
+          <a:stretch>
+            <a:fillRect/>
+          </a:stretch>
+        </p:blipFill>
+        <p:spPr bwMode="auto">
+          <a:xfrm>
+            <a:off x="10440577" y="149901"/>
+            <a:ext cx="1617251" cy="855856"/>
+          </a:xfrm>
+          <a:prstGeom prst="rect">
+            <a:avLst/>
+          </a:prstGeom>
+          <a:noFill/>
+          <a:extLst>
+            <a:ext uri="{909E8E84-426E-40DD-AFC4-6F175D3DCCD1}">
+              <a14:hiddenFill xmlns:a14="http://schemas.microsoft.com/office/drawing/2010/main">
+                <a:solidFill>
+                  <a:srgbClr val="FFFFFF"/>
+                </a:solidFill>
+              </a14:hiddenFill>
+            </a:ext>
+          </a:extLst>
+        </p:spPr>
+      </p:pic>
     </p:spTree>
     <p:extLst>
       <p:ext uri="{BB962C8B-B14F-4D97-AF65-F5344CB8AC3E}">
@@ -3437,7 +3581,6 @@
               <a:rPr lang="ru-RU" dirty="0" smtClean="0"/>
               <a:t>конечно.</a:t>
             </a:r>
-            <a:endParaRPr lang="ru-RU" dirty="0" smtClean="0"/>
           </a:p>
           <a:p>
             <a:r>
@@ -3448,6 +3591,47 @@
           </a:p>
         </p:txBody>
       </p:sp>
+      <p:pic>
+        <p:nvPicPr>
+          <p:cNvPr id="4" name="Picture 4" descr="http://www.litceysel.ru/amda/%D0%9F%D1%80%D0%BE%D0%B3%D1%80%D0%B0%D0%BC%D0%BC%D0%B0+%D0%BA%D0%BE%D0%BD%D1%84%D0%B5%D1%80%D0%B5%D0%BD%D1%86%D0%B8%D0%B8+I.+15.+00-+15.+05a/166374_html_m8967760.jpg"/>
+          <p:cNvPicPr>
+            <a:picLocks noChangeAspect="1" noChangeArrowheads="1"/>
+          </p:cNvPicPr>
+          <p:nvPr/>
+        </p:nvPicPr>
+        <p:blipFill>
+          <a:blip r:embed="rId2" cstate="print">
+            <a:extLst>
+              <a:ext uri="{28A0092B-C50C-407E-A947-70E740481C1C}">
+                <a14:useLocalDpi xmlns:a14="http://schemas.microsoft.com/office/drawing/2010/main" val="0"/>
+              </a:ext>
+            </a:extLst>
+          </a:blip>
+          <a:srcRect/>
+          <a:stretch>
+            <a:fillRect/>
+          </a:stretch>
+        </p:blipFill>
+        <p:spPr bwMode="auto">
+          <a:xfrm>
+            <a:off x="10440577" y="149901"/>
+            <a:ext cx="1617251" cy="855856"/>
+          </a:xfrm>
+          <a:prstGeom prst="rect">
+            <a:avLst/>
+          </a:prstGeom>
+          <a:noFill/>
+          <a:extLst>
+            <a:ext uri="{909E8E84-426E-40DD-AFC4-6F175D3DCCD1}">
+              <a14:hiddenFill xmlns:a14="http://schemas.microsoft.com/office/drawing/2010/main">
+                <a:solidFill>
+                  <a:srgbClr val="FFFFFF"/>
+                </a:solidFill>
+              </a14:hiddenFill>
+            </a:ext>
+          </a:extLst>
+        </p:spPr>
+      </p:pic>
     </p:spTree>
     <p:extLst>
       <p:ext uri="{BB962C8B-B14F-4D97-AF65-F5344CB8AC3E}">
@@ -3520,6 +3704,47 @@
           </a:p>
         </p:txBody>
       </p:sp>
+      <p:pic>
+        <p:nvPicPr>
+          <p:cNvPr id="4" name="Picture 4" descr="http://www.litceysel.ru/amda/%D0%9F%D1%80%D0%BE%D0%B3%D1%80%D0%B0%D0%BC%D0%BC%D0%B0+%D0%BA%D0%BE%D0%BD%D1%84%D0%B5%D1%80%D0%B5%D0%BD%D1%86%D0%B8%D0%B8+I.+15.+00-+15.+05a/166374_html_m8967760.jpg"/>
+          <p:cNvPicPr>
+            <a:picLocks noChangeAspect="1" noChangeArrowheads="1"/>
+          </p:cNvPicPr>
+          <p:nvPr/>
+        </p:nvPicPr>
+        <p:blipFill>
+          <a:blip r:embed="rId2" cstate="print">
+            <a:extLst>
+              <a:ext uri="{28A0092B-C50C-407E-A947-70E740481C1C}">
+                <a14:useLocalDpi xmlns:a14="http://schemas.microsoft.com/office/drawing/2010/main" val="0"/>
+              </a:ext>
+            </a:extLst>
+          </a:blip>
+          <a:srcRect/>
+          <a:stretch>
+            <a:fillRect/>
+          </a:stretch>
+        </p:blipFill>
+        <p:spPr bwMode="auto">
+          <a:xfrm>
+            <a:off x="10440577" y="149901"/>
+            <a:ext cx="1617251" cy="855856"/>
+          </a:xfrm>
+          <a:prstGeom prst="rect">
+            <a:avLst/>
+          </a:prstGeom>
+          <a:noFill/>
+          <a:extLst>
+            <a:ext uri="{909E8E84-426E-40DD-AFC4-6F175D3DCCD1}">
+              <a14:hiddenFill xmlns:a14="http://schemas.microsoft.com/office/drawing/2010/main">
+                <a:solidFill>
+                  <a:srgbClr val="FFFFFF"/>
+                </a:solidFill>
+              </a14:hiddenFill>
+            </a:ext>
+          </a:extLst>
+        </p:spPr>
+      </p:pic>
     </p:spTree>
     <p:extLst>
       <p:ext uri="{BB962C8B-B14F-4D97-AF65-F5344CB8AC3E}">
@@ -3592,6 +3817,47 @@
           </a:p>
         </p:txBody>
       </p:sp>
+      <p:pic>
+        <p:nvPicPr>
+          <p:cNvPr id="4" name="Picture 4" descr="http://www.litceysel.ru/amda/%D0%9F%D1%80%D0%BE%D0%B3%D1%80%D0%B0%D0%BC%D0%BC%D0%B0+%D0%BA%D0%BE%D0%BD%D1%84%D0%B5%D1%80%D0%B5%D0%BD%D1%86%D0%B8%D0%B8+I.+15.+00-+15.+05a/166374_html_m8967760.jpg"/>
+          <p:cNvPicPr>
+            <a:picLocks noChangeAspect="1" noChangeArrowheads="1"/>
+          </p:cNvPicPr>
+          <p:nvPr/>
+        </p:nvPicPr>
+        <p:blipFill>
+          <a:blip r:embed="rId2" cstate="print">
+            <a:extLst>
+              <a:ext uri="{28A0092B-C50C-407E-A947-70E740481C1C}">
+                <a14:useLocalDpi xmlns:a14="http://schemas.microsoft.com/office/drawing/2010/main" val="0"/>
+              </a:ext>
+            </a:extLst>
+          </a:blip>
+          <a:srcRect/>
+          <a:stretch>
+            <a:fillRect/>
+          </a:stretch>
+        </p:blipFill>
+        <p:spPr bwMode="auto">
+          <a:xfrm>
+            <a:off x="10440577" y="149901"/>
+            <a:ext cx="1617251" cy="855856"/>
+          </a:xfrm>
+          <a:prstGeom prst="rect">
+            <a:avLst/>
+          </a:prstGeom>
+          <a:noFill/>
+          <a:extLst>
+            <a:ext uri="{909E8E84-426E-40DD-AFC4-6F175D3DCCD1}">
+              <a14:hiddenFill xmlns:a14="http://schemas.microsoft.com/office/drawing/2010/main">
+                <a:solidFill>
+                  <a:srgbClr val="FFFFFF"/>
+                </a:solidFill>
+              </a14:hiddenFill>
+            </a:ext>
+          </a:extLst>
+        </p:spPr>
+      </p:pic>
     </p:spTree>
     <p:extLst>
       <p:ext uri="{BB962C8B-B14F-4D97-AF65-F5344CB8AC3E}">

</xml_diff>